<commit_message>
Update and improve all Docker materials
</commit_message>
<xml_diff>
--- a/01_docker/DockerCaseExample.pptx
+++ b/01_docker/DockerCaseExample.pptx
@@ -1197,7 +1197,7 @@
           <a:p>
             <a:fld id="{5645C365-1C26-6946-87AF-75D6A7DF4277}" type="datetimeFigureOut">
               <a:rPr lang="en-GB" smtClean="0"/>
-              <a:t>25/01/2024</a:t>
+              <a:t>29/08/2024</a:t>
             </a:fld>
             <a:endParaRPr lang="en-GB"/>
           </a:p>
@@ -1696,7 +1696,7 @@
           <a:p>
             <a:fld id="{35B864B8-8D08-7B43-B4FB-B2FB41A5D9E3}" type="datetime1">
               <a:rPr lang="fi-FI" smtClean="0"/>
-              <a:t>25.1.2024</a:t>
+              <a:t>29.8.2024</a:t>
             </a:fld>
             <a:endParaRPr lang="en-GB" dirty="0"/>
           </a:p>
@@ -2023,7 +2023,7 @@
           <a:p>
             <a:fld id="{D5AEA85A-FC56-D34C-9AA6-ECC3D2586F37}" type="datetime1">
               <a:rPr lang="fi-FI" smtClean="0"/>
-              <a:t>25.1.2024</a:t>
+              <a:t>29.8.2024</a:t>
             </a:fld>
             <a:endParaRPr lang="en-GB" dirty="0"/>
           </a:p>
@@ -2233,7 +2233,7 @@
           <a:p>
             <a:fld id="{E6BC6EEF-E660-7844-8930-418AFF95EA40}" type="datetime1">
               <a:rPr lang="fi-FI" smtClean="0"/>
-              <a:t>25.1.2024</a:t>
+              <a:t>29.8.2024</a:t>
             </a:fld>
             <a:endParaRPr lang="en-GB" dirty="0"/>
           </a:p>
@@ -2542,7 +2542,7 @@
           <a:p>
             <a:fld id="{4E10C7EC-C1C1-9849-A573-7692478FCD52}" type="datetime1">
               <a:rPr lang="fi-FI" smtClean="0"/>
-              <a:t>25.1.2024</a:t>
+              <a:t>29.8.2024</a:t>
             </a:fld>
             <a:endParaRPr lang="en-GB" dirty="0"/>
           </a:p>
@@ -2815,7 +2815,7 @@
           <a:p>
             <a:fld id="{844FF3FE-30BE-2040-9151-6FBC4992BF4F}" type="datetime1">
               <a:rPr lang="fi-FI" smtClean="0"/>
-              <a:t>25.1.2024</a:t>
+              <a:t>29.8.2024</a:t>
             </a:fld>
             <a:endParaRPr lang="en-GB" dirty="0"/>
           </a:p>
@@ -3055,7 +3055,7 @@
           <a:p>
             <a:fld id="{11EDCD7B-6966-E249-89F2-D46BDFBF56BE}" type="datetime1">
               <a:rPr lang="fi-FI" smtClean="0"/>
-              <a:t>25.1.2024</a:t>
+              <a:t>29.8.2024</a:t>
             </a:fld>
             <a:endParaRPr lang="en-GB" dirty="0"/>
           </a:p>
@@ -3348,7 +3348,7 @@
           <a:p>
             <a:fld id="{11EDCD7B-6966-E249-89F2-D46BDFBF56BE}" type="datetime1">
               <a:rPr lang="fi-FI" smtClean="0"/>
-              <a:t>25.1.2024</a:t>
+              <a:t>29.8.2024</a:t>
             </a:fld>
             <a:endParaRPr lang="en-GB" dirty="0"/>
           </a:p>
@@ -3787,7 +3787,7 @@
           <a:p>
             <a:fld id="{844FF3FE-30BE-2040-9151-6FBC4992BF4F}" type="datetime1">
               <a:rPr lang="fi-FI" smtClean="0"/>
-              <a:t>25.1.2024</a:t>
+              <a:t>29.8.2024</a:t>
             </a:fld>
             <a:endParaRPr lang="en-GB" dirty="0"/>
           </a:p>
@@ -4015,7 +4015,7 @@
           <a:p>
             <a:fld id="{11EDCD7B-6966-E249-89F2-D46BDFBF56BE}" type="datetime1">
               <a:rPr lang="fi-FI" smtClean="0"/>
-              <a:t>25.1.2024</a:t>
+              <a:t>29.8.2024</a:t>
             </a:fld>
             <a:endParaRPr lang="en-GB" dirty="0"/>
           </a:p>
@@ -4430,7 +4430,7 @@
           <a:p>
             <a:fld id="{B62E192A-D52B-F541-B2AA-4AEB9388F1F7}" type="datetime1">
               <a:rPr lang="fi-FI" smtClean="0"/>
-              <a:t>25.1.2024</a:t>
+              <a:t>29.8.2024</a:t>
             </a:fld>
             <a:endParaRPr lang="en-GB" dirty="0"/>
           </a:p>
@@ -4730,7 +4730,7 @@
           <a:p>
             <a:fld id="{EEA4FAA2-2B3E-264C-A42F-2D6D3EF33A3C}" type="datetime1">
               <a:rPr lang="fi-FI" smtClean="0"/>
-              <a:t>25.1.2024</a:t>
+              <a:t>29.8.2024</a:t>
             </a:fld>
             <a:endParaRPr lang="en-GB" dirty="0"/>
           </a:p>
@@ -5633,7 +5633,7 @@
           <a:p>
             <a:fld id="{B3114A65-8017-1743-A85A-B2A4BB835AE9}" type="datetime1">
               <a:rPr lang="fi-FI" smtClean="0"/>
-              <a:t>25.1.2024</a:t>
+              <a:t>29.8.2024</a:t>
             </a:fld>
             <a:endParaRPr lang="en-GB" dirty="0"/>
           </a:p>
@@ -5861,7 +5861,7 @@
           <a:p>
             <a:fld id="{11EDCD7B-6966-E249-89F2-D46BDFBF56BE}" type="datetime1">
               <a:rPr lang="fi-FI" smtClean="0"/>
-              <a:t>25.1.2024</a:t>
+              <a:t>29.8.2024</a:t>
             </a:fld>
             <a:endParaRPr lang="en-GB" dirty="0"/>
           </a:p>
@@ -6153,7 +6153,7 @@
           <a:p>
             <a:fld id="{45F98643-D206-614D-B596-3C8548138211}" type="datetime1">
               <a:rPr lang="fi-FI" smtClean="0"/>
-              <a:t>25.1.2024</a:t>
+              <a:t>29.8.2024</a:t>
             </a:fld>
             <a:endParaRPr lang="en-GB" dirty="0"/>
           </a:p>
@@ -6765,7 +6765,31 @@
           <a:p>
             <a:r>
               <a:rPr lang="en-GB" dirty="0"/>
-              <a:t>Developing, continuous integration (CI) and continuous delivery (CD) of team developed software and other assets to running environment</a:t>
+              <a:t>Developing, continuous integration (CI) and continuous delivery (CD) </a:t>
+            </a:r>
+            <a:r>
+              <a:rPr lang="en-GB" dirty="0">
+                <a:solidFill>
+                  <a:schemeClr val="tx1"/>
+                </a:solidFill>
+              </a:rPr>
+              <a:t>of</a:t>
+            </a:r>
+            <a:r>
+              <a:rPr lang="en-GB" dirty="0"/>
+              <a:t> team developed software and other assets </a:t>
+            </a:r>
+            <a:r>
+              <a:rPr lang="en-GB" dirty="0">
+                <a:solidFill>
+                  <a:schemeClr val="tx1"/>
+                </a:solidFill>
+              </a:rPr>
+              <a:t>to</a:t>
+            </a:r>
+            <a:r>
+              <a:rPr lang="en-GB" dirty="0"/>
+              <a:t> running environment</a:t>
             </a:r>
           </a:p>
         </p:txBody>
@@ -6793,7 +6817,7 @@
           <a:p>
             <a:fld id="{30BF63A1-919F-FB49-ABA8-182126D24C50}" type="datetime1">
               <a:rPr lang="fi-FI" smtClean="0"/>
-              <a:t>25.1.2024</a:t>
+              <a:t>29.8.2024</a:t>
             </a:fld>
             <a:endParaRPr lang="en-GB" dirty="0"/>
           </a:p>
@@ -6927,13 +6951,8 @@
             </a:pPr>
             <a:r>
               <a:rPr lang="en-US" dirty="0"/>
-              <a:t>The following image depicts one kind of DevOps situation/need for a normal project where we have been developing a full-stack application (frontend, backend, database) for </a:t>
-            </a:r>
-            <a:r>
-              <a:rPr lang="en-US"/>
-              <a:t>a customer. </a:t>
-            </a:r>
-            <a:endParaRPr lang="en-US" dirty="0"/>
+              <a:t>The following image depicts one kind of DevOps situation and needs. A normal project where we have been developing a full-stack application (frontend, backend, database) for a customer. </a:t>
+            </a:r>
           </a:p>
           <a:p>
             <a:pPr>
@@ -6946,7 +6965,7 @@
             </a:pPr>
             <a:r>
               <a:rPr lang="en-US" dirty="0"/>
-              <a:t>Without a good DevOps process there would be a lot of 'manual' tool and server installation, updating and configuration.</a:t>
+              <a:t>Without a good DevOps process there would be a lot of 'manual' tool and server installation, code/assets/binaries updating, configuration and deployment.</a:t>
             </a:r>
           </a:p>
           <a:p>
@@ -7007,7 +7026,7 @@
           <a:p>
             <a:fld id="{202E1EC2-47B8-044B-A09E-6A63B4D80C87}" type="datetime1">
               <a:rPr lang="fi-FI" smtClean="0"/>
-              <a:t>25.1.2024</a:t>
+              <a:t>29.8.2024</a:t>
             </a:fld>
             <a:endParaRPr lang="en-GB"/>
           </a:p>
@@ -7120,7 +7139,7 @@
           <a:p>
             <a:fld id="{202E1EC2-47B8-044B-A09E-6A63B4D80C87}" type="datetime1">
               <a:rPr lang="fi-FI" smtClean="0"/>
-              <a:t>25.1.2024</a:t>
+              <a:t>29.8.2024</a:t>
             </a:fld>
             <a:endParaRPr lang="en-GB"/>
           </a:p>
@@ -7318,7 +7337,7 @@
                 <a:ea typeface="+mn-ea"/>
                 <a:cs typeface="+mn-cs"/>
               </a:rPr>
-              <a:t>What benefits can you see with this kind of approach?</a:t>
+              <a:t>What benefits you see with this kind of approach?</a:t>
             </a:r>
           </a:p>
           <a:p>
@@ -7565,7 +7584,7 @@
           <a:p>
             <a:fld id="{202E1EC2-47B8-044B-A09E-6A63B4D80C87}" type="datetime1">
               <a:rPr lang="fi-FI" smtClean="0"/>
-              <a:t>25.1.2024</a:t>
+              <a:t>29.8.2024</a:t>
             </a:fld>
             <a:endParaRPr lang="en-GB"/>
           </a:p>
@@ -7712,7 +7731,10 @@
               <a:rPr lang="fi-FI" dirty="0" err="1"/>
               <a:t>could</a:t>
             </a:r>
-            <a:endParaRPr lang="fi-FI" dirty="0"/>
+            <a:r>
+              <a:rPr lang="fi-FI" dirty="0"/>
+              <a:t> …</a:t>
+            </a:r>
           </a:p>
         </p:txBody>
       </p:sp>
@@ -7745,7 +7767,7 @@
             </a:pPr>
             <a:r>
               <a:rPr lang="en-US" dirty="0"/>
-              <a:t>Save a lot of repetitive 'manual' work that is stressing, boring after Nth time doing same installation, and error-prone</a:t>
+              <a:t>save a lot of repetitive 'manual' work that is stressing, boring after Nth time doing same installation, and error-prone</a:t>
             </a:r>
           </a:p>
           <a:p>
@@ -7755,15 +7777,15 @@
             </a:pPr>
             <a:r>
               <a:rPr lang="en-US" dirty="0"/>
-              <a:t>Be triggered automatically when a new commit is made to main branch in GitHub. Or checked periodically e.g. with Linux </a:t>
-            </a:r>
-            <a:r>
-              <a:rPr lang="en-US" dirty="0" err="1"/>
+              <a:t>be triggered automatically when a new commit is made to main branch in GitHub. Or checked periodically e.g. with Linux </a:t>
+            </a:r>
+            <a:r>
+              <a:rPr lang="en-US" i="1" dirty="0" err="1"/>
               <a:t>cron</a:t>
             </a:r>
             <a:r>
               <a:rPr lang="en-US" dirty="0"/>
-              <a:t> timing set command</a:t>
+              <a:t> timing command</a:t>
             </a:r>
           </a:p>
           <a:p>
@@ -7773,7 +7795,7 @@
             </a:pPr>
             <a:r>
               <a:rPr lang="en-US" dirty="0"/>
-              <a:t>Fetch always the latest versions of developers' work, ready-made code libraries and images for docker containers</a:t>
+              <a:t>fetch always the latest versions of: 1. developers' work, 2. ready-made code libraries and 3. ready-made images for docker containers. (Well, if we want the latest version, e.g. while experimenting maybe)</a:t>
             </a:r>
           </a:p>
           <a:p>
@@ -7783,7 +7805,7 @@
             </a:pPr>
             <a:r>
               <a:rPr lang="en-US" dirty="0"/>
-              <a:t>Build the runnable versions for production environment (not just the development environment versions like e.g. with React web app development on laptop) and deliver them</a:t>
+              <a:t>build the runnable versions for production environment (not just the development environment versions like e.g. with React web app development on laptop) and deliver them</a:t>
             </a:r>
           </a:p>
         </p:txBody>
@@ -7811,7 +7833,7 @@
           <a:p>
             <a:fld id="{202E1EC2-47B8-044B-A09E-6A63B4D80C87}" type="datetime1">
               <a:rPr lang="fi-FI" smtClean="0"/>
-              <a:t>25.1.2024</a:t>
+              <a:t>29.8.2024</a:t>
             </a:fld>
             <a:endParaRPr lang="en-GB"/>
           </a:p>
@@ -8049,7 +8071,7 @@
           <a:p>
             <a:fld id="{202E1EC2-47B8-044B-A09E-6A63B4D80C87}" type="datetime1">
               <a:rPr lang="fi-FI" smtClean="0"/>
-              <a:t>25.1.2024</a:t>
+              <a:t>29.8.2024</a:t>
             </a:fld>
             <a:endParaRPr lang="en-GB"/>
           </a:p>
@@ -8252,7 +8274,23 @@
             </a:r>
             <a:r>
               <a:rPr lang="fi-FI" dirty="0"/>
-              <a:t> some </a:t>
+              <a:t> </a:t>
+            </a:r>
+            <a:r>
+              <a:rPr lang="fi-FI" dirty="0" err="1"/>
+              <a:t>reasonable</a:t>
+            </a:r>
+            <a:r>
+              <a:rPr lang="fi-FI" dirty="0"/>
+              <a:t> </a:t>
+            </a:r>
+            <a:r>
+              <a:rPr lang="fi-FI" dirty="0" err="1"/>
+              <a:t>amount</a:t>
+            </a:r>
+            <a:r>
+              <a:rPr lang="fi-FI"/>
+              <a:t> of </a:t>
             </a:r>
             <a:r>
               <a:rPr lang="fi-FI" dirty="0" err="1"/>
@@ -8305,7 +8343,7 @@
           <a:p>
             <a:fld id="{7A2E22EC-FB8F-BE4C-8513-60D11DB7758C}" type="datetime1">
               <a:rPr lang="fi-FI" smtClean="0"/>
-              <a:t>25.1.2024</a:t>
+              <a:t>29.8.2024</a:t>
             </a:fld>
             <a:endParaRPr lang="en-GB"/>
           </a:p>
@@ -8944,6 +8982,15 @@
 </file>
 
 <file path=customXml/item2.xml><?xml version="1.0" encoding="utf-8"?>
+<p:properties xmlns:p="http://schemas.microsoft.com/office/2006/metadata/properties" xmlns:xsi="http://www.w3.org/2001/XMLSchema-instance" xmlns:pc="http://schemas.microsoft.com/office/infopath/2007/PartnerControls">
+  <documentManagement>
+    <PublishingExpirationDate xmlns="http://schemas.microsoft.com/sharepoint/v3" xsi:nil="true"/>
+    <PublishingStartDate xmlns="http://schemas.microsoft.com/sharepoint/v3" xsi:nil="true"/>
+  </documentManagement>
+</p:properties>
+</file>
+
+<file path=customXml/item3.xml><?xml version="1.0" encoding="utf-8"?>
 <ct:contentTypeSchema xmlns:ct="http://schemas.microsoft.com/office/2006/metadata/contentType" xmlns:ma="http://schemas.microsoft.com/office/2006/metadata/properties/metaAttributes" ct:_="" ma:_="" ma:contentTypeName="Document" ma:contentTypeID="0x01010024C55B41993A414DABB8DD07ACBA0814" ma:contentTypeVersion="1" ma:contentTypeDescription="Create a new document." ma:contentTypeScope="" ma:versionID="3ea0c22b5866975a7b271665de4056c5">
   <xsd:schema xmlns:xsd="http://www.w3.org/2001/XMLSchema" xmlns:xs="http://www.w3.org/2001/XMLSchema" xmlns:p="http://schemas.microsoft.com/office/2006/metadata/properties" xmlns:ns1="http://schemas.microsoft.com/sharepoint/v3" targetNamespace="http://schemas.microsoft.com/office/2006/metadata/properties" ma:root="true" ma:fieldsID="ef2aa9ed40e72a78c3822fc753b43e87" ns1:_="">
     <xsd:import namespace="http://schemas.microsoft.com/sharepoint/v3"/>
@@ -9075,15 +9122,6 @@
 </ct:contentTypeSchema>
 </file>
 
-<file path=customXml/item3.xml><?xml version="1.0" encoding="utf-8"?>
-<p:properties xmlns:p="http://schemas.microsoft.com/office/2006/metadata/properties" xmlns:xsi="http://www.w3.org/2001/XMLSchema-instance" xmlns:pc="http://schemas.microsoft.com/office/infopath/2007/PartnerControls">
-  <documentManagement>
-    <PublishingExpirationDate xmlns="http://schemas.microsoft.com/sharepoint/v3" xsi:nil="true"/>
-    <PublishingStartDate xmlns="http://schemas.microsoft.com/sharepoint/v3" xsi:nil="true"/>
-  </documentManagement>
-</p:properties>
-</file>
-
 <file path=customXml/itemProps1.xml><?xml version="1.0" encoding="utf-8"?>
 <ds:datastoreItem xmlns:ds="http://schemas.openxmlformats.org/officeDocument/2006/customXml" ds:itemID="{D546C03B-CD3A-4EA0-AAA4-0E00E896454E}">
   <ds:schemaRefs>
@@ -9093,6 +9131,22 @@
 </file>
 
 <file path=customXml/itemProps2.xml><?xml version="1.0" encoding="utf-8"?>
+<ds:datastoreItem xmlns:ds="http://schemas.openxmlformats.org/officeDocument/2006/customXml" ds:itemID="{DED4E12E-7268-4B03-A47B-0755D62B5E31}">
+  <ds:schemaRefs>
+    <ds:schemaRef ds:uri="http://schemas.microsoft.com/sharepoint/v3"/>
+    <ds:schemaRef ds:uri="http://schemas.microsoft.com/office/2006/documentManagement/types"/>
+    <ds:schemaRef ds:uri="http://purl.org/dc/dcmitype/"/>
+    <ds:schemaRef ds:uri="http://purl.org/dc/elements/1.1/"/>
+    <ds:schemaRef ds:uri="http://schemas.microsoft.com/office/infopath/2007/PartnerControls"/>
+    <ds:schemaRef ds:uri="http://purl.org/dc/terms/"/>
+    <ds:schemaRef ds:uri="http://schemas.openxmlformats.org/package/2006/metadata/core-properties"/>
+    <ds:schemaRef ds:uri="http://schemas.microsoft.com/office/2006/metadata/properties"/>
+    <ds:schemaRef ds:uri="http://www.w3.org/XML/1998/namespace"/>
+  </ds:schemaRefs>
+</ds:datastoreItem>
+</file>
+
+<file path=customXml/itemProps3.xml><?xml version="1.0" encoding="utf-8"?>
 <ds:datastoreItem xmlns:ds="http://schemas.openxmlformats.org/officeDocument/2006/customXml" ds:itemID="{B9E4DC25-62AA-44A0-8D5C-DB44892588AF}">
   <ds:schemaRefs>
     <ds:schemaRef ds:uri="http://schemas.microsoft.com/office/2006/metadata/contentType"/>
@@ -9108,20 +9162,4 @@
     <ds:schemaRef ds:uri="http://schemas.microsoft.com/internal/obd"/>
   </ds:schemaRefs>
 </ds:datastoreItem>
-</file>
-
-<file path=customXml/itemProps3.xml><?xml version="1.0" encoding="utf-8"?>
-<ds:datastoreItem xmlns:ds="http://schemas.openxmlformats.org/officeDocument/2006/customXml" ds:itemID="{DED4E12E-7268-4B03-A47B-0755D62B5E31}">
-  <ds:schemaRefs>
-    <ds:schemaRef ds:uri="http://schemas.microsoft.com/sharepoint/v3"/>
-    <ds:schemaRef ds:uri="http://schemas.microsoft.com/office/2006/documentManagement/types"/>
-    <ds:schemaRef ds:uri="http://purl.org/dc/dcmitype/"/>
-    <ds:schemaRef ds:uri="http://purl.org/dc/elements/1.1/"/>
-    <ds:schemaRef ds:uri="http://schemas.microsoft.com/office/infopath/2007/PartnerControls"/>
-    <ds:schemaRef ds:uri="http://purl.org/dc/terms/"/>
-    <ds:schemaRef ds:uri="http://schemas.openxmlformats.org/package/2006/metadata/core-properties"/>
-    <ds:schemaRef ds:uri="http://schemas.microsoft.com/office/2006/metadata/properties"/>
-    <ds:schemaRef ds:uri="http://www.w3.org/XML/1998/namespace"/>
-  </ds:schemaRefs>
-</ds:datastoreItem>
 </file>
</xml_diff>